<commit_message>
add learning point in PowerPoint presentation
</commit_message>
<xml_diff>
--- a/First-Rate-Games.pptx
+++ b/First-Rate-Games.pptx
@@ -1448,6 +1448,13 @@
         </dgm:presLayoutVars>
       </dgm:prSet>
       <dgm:spPr/>
+      <dgm:t>
+        <a:bodyPr/>
+        <a:lstStyle/>
+        <a:p>
+          <a:endParaRPr lang="en-US"/>
+        </a:p>
+      </dgm:t>
     </dgm:pt>
     <dgm:pt modelId="{3B23570A-ECC9-4DF8-BCB4-0465C69CBB88}" type="pres">
       <dgm:prSet presAssocID="{B4F1B46E-22B2-4721-950C-8704487586DC}" presName="posSpace" presStyleCnt="0"/>
@@ -1468,6 +1475,13 @@
     <dgm:pt modelId="{6B08AC4B-4CEC-41E5-AE19-47A4E2720563}" type="pres">
       <dgm:prSet presAssocID="{B4F1B46E-22B2-4721-950C-8704487586DC}" presName="firstChild" presStyleLbl="bgAccFollowNode1" presStyleIdx="0" presStyleCnt="11"/>
       <dgm:spPr/>
+      <dgm:t>
+        <a:bodyPr/>
+        <a:lstStyle/>
+        <a:p>
+          <a:endParaRPr lang="en-US"/>
+        </a:p>
+      </dgm:t>
     </dgm:pt>
     <dgm:pt modelId="{187D4E8C-5C91-4D00-870C-2C45D4EA263C}" type="pres">
       <dgm:prSet presAssocID="{B4F1B46E-22B2-4721-950C-8704487586DC}" presName="firstChildTx" presStyleLbl="bgAccFollowNode1" presStyleIdx="0" presStyleCnt="11">
@@ -1476,6 +1490,13 @@
         </dgm:presLayoutVars>
       </dgm:prSet>
       <dgm:spPr/>
+      <dgm:t>
+        <a:bodyPr/>
+        <a:lstStyle/>
+        <a:p>
+          <a:endParaRPr lang="en-US"/>
+        </a:p>
+      </dgm:t>
     </dgm:pt>
     <dgm:pt modelId="{ADF61BBD-28F4-4815-BC7F-82CF00464E8B}" type="pres">
       <dgm:prSet presAssocID="{F9D46839-CD06-4669-AAE4-4D1E9AFEDA78}" presName="comp" presStyleCnt="0"/>
@@ -1484,6 +1505,13 @@
     <dgm:pt modelId="{59179C9B-8BA4-4AC7-ACB1-A12DE00142E2}" type="pres">
       <dgm:prSet presAssocID="{F9D46839-CD06-4669-AAE4-4D1E9AFEDA78}" presName="child" presStyleLbl="bgAccFollowNode1" presStyleIdx="1" presStyleCnt="11"/>
       <dgm:spPr/>
+      <dgm:t>
+        <a:bodyPr/>
+        <a:lstStyle/>
+        <a:p>
+          <a:endParaRPr lang="en-US"/>
+        </a:p>
+      </dgm:t>
     </dgm:pt>
     <dgm:pt modelId="{4AE7D907-B6F4-4647-AB3F-ABE94C438AE8}" type="pres">
       <dgm:prSet presAssocID="{F9D46839-CD06-4669-AAE4-4D1E9AFEDA78}" presName="childTx" presStyleLbl="bgAccFollowNode1" presStyleIdx="1" presStyleCnt="11">
@@ -1492,6 +1520,13 @@
         </dgm:presLayoutVars>
       </dgm:prSet>
       <dgm:spPr/>
+      <dgm:t>
+        <a:bodyPr/>
+        <a:lstStyle/>
+        <a:p>
+          <a:endParaRPr lang="en-US"/>
+        </a:p>
+      </dgm:t>
     </dgm:pt>
     <dgm:pt modelId="{E50A9A83-9985-4184-A476-E3402BD8E76E}" type="pres">
       <dgm:prSet presAssocID="{7CB6360B-4022-4E96-922B-A12DE0E2A39F}" presName="comp" presStyleCnt="0"/>
@@ -1500,6 +1535,13 @@
     <dgm:pt modelId="{1877502C-A892-4DC0-ADA6-FA065097BB90}" type="pres">
       <dgm:prSet presAssocID="{7CB6360B-4022-4E96-922B-A12DE0E2A39F}" presName="child" presStyleLbl="bgAccFollowNode1" presStyleIdx="2" presStyleCnt="11"/>
       <dgm:spPr/>
+      <dgm:t>
+        <a:bodyPr/>
+        <a:lstStyle/>
+        <a:p>
+          <a:endParaRPr lang="en-US"/>
+        </a:p>
+      </dgm:t>
     </dgm:pt>
     <dgm:pt modelId="{D685DD23-B321-4B5E-842F-394CB33239FA}" type="pres">
       <dgm:prSet presAssocID="{7CB6360B-4022-4E96-922B-A12DE0E2A39F}" presName="childTx" presStyleLbl="bgAccFollowNode1" presStyleIdx="2" presStyleCnt="11">
@@ -1508,6 +1550,13 @@
         </dgm:presLayoutVars>
       </dgm:prSet>
       <dgm:spPr/>
+      <dgm:t>
+        <a:bodyPr/>
+        <a:lstStyle/>
+        <a:p>
+          <a:endParaRPr lang="en-US"/>
+        </a:p>
+      </dgm:t>
     </dgm:pt>
     <dgm:pt modelId="{E5677DE7-299C-4C9C-A4BC-6335CC601D12}" type="pres">
       <dgm:prSet presAssocID="{70879558-61CA-4CCD-B2D6-5349B01EF337}" presName="comp" presStyleCnt="0"/>
@@ -1516,6 +1565,13 @@
     <dgm:pt modelId="{51F68A05-A560-4C6F-BC90-521AEF3B0907}" type="pres">
       <dgm:prSet presAssocID="{70879558-61CA-4CCD-B2D6-5349B01EF337}" presName="child" presStyleLbl="bgAccFollowNode1" presStyleIdx="3" presStyleCnt="11"/>
       <dgm:spPr/>
+      <dgm:t>
+        <a:bodyPr/>
+        <a:lstStyle/>
+        <a:p>
+          <a:endParaRPr lang="en-US"/>
+        </a:p>
+      </dgm:t>
     </dgm:pt>
     <dgm:pt modelId="{3EBE42F0-6491-49CC-95DC-985BA00CD458}" type="pres">
       <dgm:prSet presAssocID="{70879558-61CA-4CCD-B2D6-5349B01EF337}" presName="childTx" presStyleLbl="bgAccFollowNode1" presStyleIdx="3" presStyleCnt="11">
@@ -1524,6 +1580,13 @@
         </dgm:presLayoutVars>
       </dgm:prSet>
       <dgm:spPr/>
+      <dgm:t>
+        <a:bodyPr/>
+        <a:lstStyle/>
+        <a:p>
+          <a:endParaRPr lang="en-US"/>
+        </a:p>
+      </dgm:t>
     </dgm:pt>
     <dgm:pt modelId="{3845DB9A-BEF3-4D5D-B9C7-5FC0456401AC}" type="pres">
       <dgm:prSet presAssocID="{B4F1B46E-22B2-4721-950C-8704487586DC}" presName="negSpace" presStyleCnt="0"/>
@@ -1532,6 +1595,13 @@
     <dgm:pt modelId="{FC7ED273-8CFD-43C2-9C05-44FADF3E0637}" type="pres">
       <dgm:prSet presAssocID="{B4F1B46E-22B2-4721-950C-8704487586DC}" presName="circle" presStyleLbl="node1" presStyleIdx="0" presStyleCnt="4"/>
       <dgm:spPr/>
+      <dgm:t>
+        <a:bodyPr/>
+        <a:lstStyle/>
+        <a:p>
+          <a:endParaRPr lang="en-US"/>
+        </a:p>
+      </dgm:t>
     </dgm:pt>
     <dgm:pt modelId="{13C564B0-C27E-4ABA-AFDA-59E145B256BA}" type="pres">
       <dgm:prSet presAssocID="{A7E2530A-34E2-4E9F-BC78-8920BA140C41}" presName="transSpace" presStyleCnt="0"/>
@@ -1556,6 +1626,13 @@
     <dgm:pt modelId="{F660F4B9-35DB-4256-A868-A35C6DCCF6B2}" type="pres">
       <dgm:prSet presAssocID="{F2881FB1-6580-4F21-A283-BFAA6F91D5D2}" presName="firstChild" presStyleLbl="bgAccFollowNode1" presStyleIdx="4" presStyleCnt="11"/>
       <dgm:spPr/>
+      <dgm:t>
+        <a:bodyPr/>
+        <a:lstStyle/>
+        <a:p>
+          <a:endParaRPr lang="en-US"/>
+        </a:p>
+      </dgm:t>
     </dgm:pt>
     <dgm:pt modelId="{10C9E3CF-3A8F-4100-8ACD-91E2373197A2}" type="pres">
       <dgm:prSet presAssocID="{F2881FB1-6580-4F21-A283-BFAA6F91D5D2}" presName="firstChildTx" presStyleLbl="bgAccFollowNode1" presStyleIdx="4" presStyleCnt="11">
@@ -1564,6 +1641,13 @@
         </dgm:presLayoutVars>
       </dgm:prSet>
       <dgm:spPr/>
+      <dgm:t>
+        <a:bodyPr/>
+        <a:lstStyle/>
+        <a:p>
+          <a:endParaRPr lang="en-US"/>
+        </a:p>
+      </dgm:t>
     </dgm:pt>
     <dgm:pt modelId="{60887C36-4733-46AC-A452-5444F6BC3B23}" type="pres">
       <dgm:prSet presAssocID="{29E78340-8EBE-415C-B973-78A91A054B9C}" presName="comp" presStyleCnt="0"/>
@@ -1572,6 +1656,13 @@
     <dgm:pt modelId="{614EBA0E-D12B-447E-B378-B0FA2DEBEA2F}" type="pres">
       <dgm:prSet presAssocID="{29E78340-8EBE-415C-B973-78A91A054B9C}" presName="child" presStyleLbl="bgAccFollowNode1" presStyleIdx="5" presStyleCnt="11"/>
       <dgm:spPr/>
+      <dgm:t>
+        <a:bodyPr/>
+        <a:lstStyle/>
+        <a:p>
+          <a:endParaRPr lang="en-US"/>
+        </a:p>
+      </dgm:t>
     </dgm:pt>
     <dgm:pt modelId="{B12AEB83-0A64-4B36-BF01-B2F834861BAA}" type="pres">
       <dgm:prSet presAssocID="{29E78340-8EBE-415C-B973-78A91A054B9C}" presName="childTx" presStyleLbl="bgAccFollowNode1" presStyleIdx="5" presStyleCnt="11">
@@ -1580,6 +1671,13 @@
         </dgm:presLayoutVars>
       </dgm:prSet>
       <dgm:spPr/>
+      <dgm:t>
+        <a:bodyPr/>
+        <a:lstStyle/>
+        <a:p>
+          <a:endParaRPr lang="en-US"/>
+        </a:p>
+      </dgm:t>
     </dgm:pt>
     <dgm:pt modelId="{3055F178-D8CA-413A-99F2-20C8231C0651}" type="pres">
       <dgm:prSet presAssocID="{8321AB85-EA8C-4958-B404-B4C118CB3C18}" presName="comp" presStyleCnt="0"/>
@@ -1588,6 +1686,13 @@
     <dgm:pt modelId="{68509703-D239-4E1B-8CF0-EF08079E1226}" type="pres">
       <dgm:prSet presAssocID="{8321AB85-EA8C-4958-B404-B4C118CB3C18}" presName="child" presStyleLbl="bgAccFollowNode1" presStyleIdx="6" presStyleCnt="11"/>
       <dgm:spPr/>
+      <dgm:t>
+        <a:bodyPr/>
+        <a:lstStyle/>
+        <a:p>
+          <a:endParaRPr lang="en-US"/>
+        </a:p>
+      </dgm:t>
     </dgm:pt>
     <dgm:pt modelId="{E1767793-EDD5-4203-A612-8120A71CA906}" type="pres">
       <dgm:prSet presAssocID="{8321AB85-EA8C-4958-B404-B4C118CB3C18}" presName="childTx" presStyleLbl="bgAccFollowNode1" presStyleIdx="6" presStyleCnt="11">
@@ -1596,6 +1701,13 @@
         </dgm:presLayoutVars>
       </dgm:prSet>
       <dgm:spPr/>
+      <dgm:t>
+        <a:bodyPr/>
+        <a:lstStyle/>
+        <a:p>
+          <a:endParaRPr lang="en-US"/>
+        </a:p>
+      </dgm:t>
     </dgm:pt>
     <dgm:pt modelId="{69136330-53DB-4978-A56B-160862279381}" type="pres">
       <dgm:prSet presAssocID="{F2881FB1-6580-4F21-A283-BFAA6F91D5D2}" presName="negSpace" presStyleCnt="0"/>
@@ -1604,6 +1716,13 @@
     <dgm:pt modelId="{FD776C1E-557E-4553-9447-49B69EEC7907}" type="pres">
       <dgm:prSet presAssocID="{F2881FB1-6580-4F21-A283-BFAA6F91D5D2}" presName="circle" presStyleLbl="node1" presStyleIdx="1" presStyleCnt="4"/>
       <dgm:spPr/>
+      <dgm:t>
+        <a:bodyPr/>
+        <a:lstStyle/>
+        <a:p>
+          <a:endParaRPr lang="en-US"/>
+        </a:p>
+      </dgm:t>
     </dgm:pt>
     <dgm:pt modelId="{FC2522F1-14BB-4B37-B60E-2E8A7E8A6C30}" type="pres">
       <dgm:prSet presAssocID="{A5ABDC17-7AB5-4F0E-992A-F9343F5D74EB}" presName="transSpace" presStyleCnt="0"/>
@@ -1628,6 +1747,13 @@
     <dgm:pt modelId="{AD2806AC-6A03-4F05-9F4D-F72EA0E56FBF}" type="pres">
       <dgm:prSet presAssocID="{6352CA33-6755-44BE-808F-400DA4CF80A7}" presName="firstChild" presStyleLbl="bgAccFollowNode1" presStyleIdx="7" presStyleCnt="11"/>
       <dgm:spPr/>
+      <dgm:t>
+        <a:bodyPr/>
+        <a:lstStyle/>
+        <a:p>
+          <a:endParaRPr lang="en-US"/>
+        </a:p>
+      </dgm:t>
     </dgm:pt>
     <dgm:pt modelId="{F8977219-728E-448F-AE8B-46B14F4F17DE}" type="pres">
       <dgm:prSet presAssocID="{6352CA33-6755-44BE-808F-400DA4CF80A7}" presName="firstChildTx" presStyleLbl="bgAccFollowNode1" presStyleIdx="7" presStyleCnt="11">
@@ -1636,6 +1762,13 @@
         </dgm:presLayoutVars>
       </dgm:prSet>
       <dgm:spPr/>
+      <dgm:t>
+        <a:bodyPr/>
+        <a:lstStyle/>
+        <a:p>
+          <a:endParaRPr lang="en-US"/>
+        </a:p>
+      </dgm:t>
     </dgm:pt>
     <dgm:pt modelId="{46A8623B-DC64-4ED6-B73D-98FEAB030508}" type="pres">
       <dgm:prSet presAssocID="{3D5CDB25-F8FA-444B-8D4A-1D29D0CBA282}" presName="comp" presStyleCnt="0"/>
@@ -1644,6 +1777,13 @@
     <dgm:pt modelId="{5314AADB-0AD3-4BAE-9F15-B0FE4F44C802}" type="pres">
       <dgm:prSet presAssocID="{3D5CDB25-F8FA-444B-8D4A-1D29D0CBA282}" presName="child" presStyleLbl="bgAccFollowNode1" presStyleIdx="8" presStyleCnt="11"/>
       <dgm:spPr/>
+      <dgm:t>
+        <a:bodyPr/>
+        <a:lstStyle/>
+        <a:p>
+          <a:endParaRPr lang="en-US"/>
+        </a:p>
+      </dgm:t>
     </dgm:pt>
     <dgm:pt modelId="{96624143-7928-48E9-817F-BC4A07250C32}" type="pres">
       <dgm:prSet presAssocID="{3D5CDB25-F8FA-444B-8D4A-1D29D0CBA282}" presName="childTx" presStyleLbl="bgAccFollowNode1" presStyleIdx="8" presStyleCnt="11">
@@ -1652,6 +1792,13 @@
         </dgm:presLayoutVars>
       </dgm:prSet>
       <dgm:spPr/>
+      <dgm:t>
+        <a:bodyPr/>
+        <a:lstStyle/>
+        <a:p>
+          <a:endParaRPr lang="en-US"/>
+        </a:p>
+      </dgm:t>
     </dgm:pt>
     <dgm:pt modelId="{FBCC4E74-37C0-494F-ABC0-7D18132E1437}" type="pres">
       <dgm:prSet presAssocID="{6352CA33-6755-44BE-808F-400DA4CF80A7}" presName="negSpace" presStyleCnt="0"/>
@@ -1660,6 +1807,13 @@
     <dgm:pt modelId="{89E6DA6E-7A23-44BD-8A99-378091FF741D}" type="pres">
       <dgm:prSet presAssocID="{6352CA33-6755-44BE-808F-400DA4CF80A7}" presName="circle" presStyleLbl="node1" presStyleIdx="2" presStyleCnt="4"/>
       <dgm:spPr/>
+      <dgm:t>
+        <a:bodyPr/>
+        <a:lstStyle/>
+        <a:p>
+          <a:endParaRPr lang="en-US"/>
+        </a:p>
+      </dgm:t>
     </dgm:pt>
     <dgm:pt modelId="{E966790E-26B5-4EB8-981F-1094BF4B7611}" type="pres">
       <dgm:prSet presAssocID="{AAB4CF73-4B9B-4AA0-9074-16C2D2AE00A1}" presName="transSpace" presStyleCnt="0"/>
@@ -1684,6 +1838,13 @@
     <dgm:pt modelId="{402C2C77-A32C-4D99-9940-12535E1181F2}" type="pres">
       <dgm:prSet presAssocID="{7FCE83D9-631B-4420-BBFC-CA0AFA59F747}" presName="firstChild" presStyleLbl="bgAccFollowNode1" presStyleIdx="9" presStyleCnt="11"/>
       <dgm:spPr/>
+      <dgm:t>
+        <a:bodyPr/>
+        <a:lstStyle/>
+        <a:p>
+          <a:endParaRPr lang="en-US"/>
+        </a:p>
+      </dgm:t>
     </dgm:pt>
     <dgm:pt modelId="{5B88A17E-EFF5-4A04-9CC9-D2131DA9ECCC}" type="pres">
       <dgm:prSet presAssocID="{7FCE83D9-631B-4420-BBFC-CA0AFA59F747}" presName="firstChildTx" presStyleLbl="bgAccFollowNode1" presStyleIdx="9" presStyleCnt="11">
@@ -1692,6 +1853,13 @@
         </dgm:presLayoutVars>
       </dgm:prSet>
       <dgm:spPr/>
+      <dgm:t>
+        <a:bodyPr/>
+        <a:lstStyle/>
+        <a:p>
+          <a:endParaRPr lang="en-US"/>
+        </a:p>
+      </dgm:t>
     </dgm:pt>
     <dgm:pt modelId="{F3C2D87B-A5E7-46E2-B3D3-58E6D9562663}" type="pres">
       <dgm:prSet presAssocID="{50451020-5E1A-4778-9E8D-169182A36191}" presName="comp" presStyleCnt="0"/>
@@ -1700,6 +1868,13 @@
     <dgm:pt modelId="{3086D0BF-AAD1-4310-88ED-4D81A687BD50}" type="pres">
       <dgm:prSet presAssocID="{50451020-5E1A-4778-9E8D-169182A36191}" presName="child" presStyleLbl="bgAccFollowNode1" presStyleIdx="10" presStyleCnt="11"/>
       <dgm:spPr/>
+      <dgm:t>
+        <a:bodyPr/>
+        <a:lstStyle/>
+        <a:p>
+          <a:endParaRPr lang="en-US"/>
+        </a:p>
+      </dgm:t>
     </dgm:pt>
     <dgm:pt modelId="{2B18CCD9-D6B1-4225-8D26-4BA691BB1837}" type="pres">
       <dgm:prSet presAssocID="{50451020-5E1A-4778-9E8D-169182A36191}" presName="childTx" presStyleLbl="bgAccFollowNode1" presStyleIdx="10" presStyleCnt="11">
@@ -1708,6 +1883,13 @@
         </dgm:presLayoutVars>
       </dgm:prSet>
       <dgm:spPr/>
+      <dgm:t>
+        <a:bodyPr/>
+        <a:lstStyle/>
+        <a:p>
+          <a:endParaRPr lang="en-US"/>
+        </a:p>
+      </dgm:t>
     </dgm:pt>
     <dgm:pt modelId="{9051EF7D-7D6C-4B43-A6C4-239F9933C94D}" type="pres">
       <dgm:prSet presAssocID="{7FCE83D9-631B-4420-BBFC-CA0AFA59F747}" presName="negSpace" presStyleCnt="0"/>
@@ -1716,6 +1898,13 @@
     <dgm:pt modelId="{7453D9C8-CD6E-4AA4-8A19-7F6F667528F0}" type="pres">
       <dgm:prSet presAssocID="{7FCE83D9-631B-4420-BBFC-CA0AFA59F747}" presName="circle" presStyleLbl="node1" presStyleIdx="3" presStyleCnt="4"/>
       <dgm:spPr/>
+      <dgm:t>
+        <a:bodyPr/>
+        <a:lstStyle/>
+        <a:p>
+          <a:endParaRPr lang="en-US"/>
+        </a:p>
+      </dgm:t>
     </dgm:pt>
   </dgm:ptLst>
   <dgm:cxnLst>
@@ -1892,7 +2081,7 @@
         </a:bodyPr>
         <a:lstStyle/>
         <a:p>
-          <a:pPr marL="0" lvl="0" indent="0" algn="l" defTabSz="800100">
+          <a:pPr lvl="0" algn="l" defTabSz="800100">
             <a:lnSpc>
               <a:spcPct val="90000"/>
             </a:lnSpc>
@@ -1902,7 +2091,6 @@
             <a:spcAft>
               <a:spcPct val="35000"/>
             </a:spcAft>
-            <a:buNone/>
           </a:pPr>
           <a:r>
             <a:rPr lang="en-US" sz="1800" kern="1200" dirty="0"/>
@@ -1971,7 +2159,7 @@
         </a:bodyPr>
         <a:lstStyle/>
         <a:p>
-          <a:pPr marL="0" lvl="0" indent="0" algn="l" defTabSz="800100">
+          <a:pPr lvl="0" algn="l" defTabSz="800100">
             <a:lnSpc>
               <a:spcPct val="90000"/>
             </a:lnSpc>
@@ -1981,7 +2169,6 @@
             <a:spcAft>
               <a:spcPct val="35000"/>
             </a:spcAft>
-            <a:buNone/>
           </a:pPr>
           <a:r>
             <a:rPr lang="en-US" sz="1800" kern="1200" dirty="0"/>
@@ -2050,7 +2237,7 @@
         </a:bodyPr>
         <a:lstStyle/>
         <a:p>
-          <a:pPr marL="0" lvl="0" indent="0" algn="l" defTabSz="800100">
+          <a:pPr lvl="0" algn="l" defTabSz="800100">
             <a:lnSpc>
               <a:spcPct val="90000"/>
             </a:lnSpc>
@@ -2060,7 +2247,6 @@
             <a:spcAft>
               <a:spcPct val="35000"/>
             </a:spcAft>
-            <a:buNone/>
           </a:pPr>
           <a:r>
             <a:rPr lang="en-US" sz="1800" kern="1200" dirty="0"/>
@@ -2129,7 +2315,7 @@
         </a:bodyPr>
         <a:lstStyle/>
         <a:p>
-          <a:pPr marL="0" lvl="0" indent="0" algn="l" defTabSz="800100">
+          <a:pPr lvl="0" algn="l" defTabSz="800100">
             <a:lnSpc>
               <a:spcPct val="90000"/>
             </a:lnSpc>
@@ -2139,7 +2325,6 @@
             <a:spcAft>
               <a:spcPct val="35000"/>
             </a:spcAft>
-            <a:buNone/>
           </a:pPr>
           <a:r>
             <a:rPr lang="en-US" sz="1800" kern="1200" dirty="0"/>
@@ -2233,7 +2418,7 @@
         </a:bodyPr>
         <a:lstStyle/>
         <a:p>
-          <a:pPr marL="0" lvl="0" indent="0" algn="ctr" defTabSz="933450">
+          <a:pPr lvl="0" algn="ctr" defTabSz="933450">
             <a:lnSpc>
               <a:spcPct val="90000"/>
             </a:lnSpc>
@@ -2243,7 +2428,6 @@
             <a:spcAft>
               <a:spcPct val="35000"/>
             </a:spcAft>
-            <a:buNone/>
           </a:pPr>
           <a:r>
             <a:rPr lang="en-US" sz="2100" kern="1200"/>
@@ -2313,7 +2497,7 @@
         </a:bodyPr>
         <a:lstStyle/>
         <a:p>
-          <a:pPr marL="0" lvl="0" indent="0" algn="l" defTabSz="800100">
+          <a:pPr lvl="0" algn="l" defTabSz="800100">
             <a:lnSpc>
               <a:spcPct val="90000"/>
             </a:lnSpc>
@@ -2323,7 +2507,6 @@
             <a:spcAft>
               <a:spcPct val="35000"/>
             </a:spcAft>
-            <a:buNone/>
           </a:pPr>
           <a:r>
             <a:rPr lang="en-US" sz="1800" kern="1200" dirty="0"/>
@@ -2392,7 +2575,7 @@
         </a:bodyPr>
         <a:lstStyle/>
         <a:p>
-          <a:pPr marL="0" lvl="0" indent="0" algn="l" defTabSz="800100">
+          <a:pPr lvl="0" algn="l" defTabSz="800100">
             <a:lnSpc>
               <a:spcPct val="90000"/>
             </a:lnSpc>
@@ -2402,7 +2585,6 @@
             <a:spcAft>
               <a:spcPct val="35000"/>
             </a:spcAft>
-            <a:buNone/>
           </a:pPr>
           <a:r>
             <a:rPr lang="en-US" sz="1800" kern="1200" dirty="0"/>
@@ -2471,7 +2653,7 @@
         </a:bodyPr>
         <a:lstStyle/>
         <a:p>
-          <a:pPr marL="0" lvl="0" indent="0" algn="l" defTabSz="800100">
+          <a:pPr lvl="0" algn="l" defTabSz="800100">
             <a:lnSpc>
               <a:spcPct val="90000"/>
             </a:lnSpc>
@@ -2481,7 +2663,6 @@
             <a:spcAft>
               <a:spcPct val="35000"/>
             </a:spcAft>
-            <a:buNone/>
           </a:pPr>
           <a:r>
             <a:rPr lang="en-US" sz="1800" kern="1200" dirty="0"/>
@@ -2575,7 +2756,7 @@
         </a:bodyPr>
         <a:lstStyle/>
         <a:p>
-          <a:pPr marL="0" lvl="0" indent="0" algn="ctr" defTabSz="933450">
+          <a:pPr lvl="0" algn="ctr" defTabSz="933450">
             <a:lnSpc>
               <a:spcPct val="90000"/>
             </a:lnSpc>
@@ -2585,7 +2766,6 @@
             <a:spcAft>
               <a:spcPct val="35000"/>
             </a:spcAft>
-            <a:buNone/>
           </a:pPr>
           <a:r>
             <a:rPr lang="en-US" sz="2100" kern="1200" dirty="0"/>
@@ -2654,7 +2834,7 @@
         </a:bodyPr>
         <a:lstStyle/>
         <a:p>
-          <a:pPr marL="0" lvl="0" indent="0" algn="l" defTabSz="800100">
+          <a:pPr lvl="0" algn="l" defTabSz="800100">
             <a:lnSpc>
               <a:spcPct val="90000"/>
             </a:lnSpc>
@@ -2664,7 +2844,6 @@
             <a:spcAft>
               <a:spcPct val="35000"/>
             </a:spcAft>
-            <a:buNone/>
           </a:pPr>
           <a:r>
             <a:rPr lang="en-US" sz="1800" kern="1200" dirty="0"/>
@@ -2733,7 +2912,7 @@
         </a:bodyPr>
         <a:lstStyle/>
         <a:p>
-          <a:pPr marL="0" lvl="0" indent="0" algn="l" defTabSz="800100">
+          <a:pPr lvl="0" algn="l" defTabSz="800100">
             <a:lnSpc>
               <a:spcPct val="90000"/>
             </a:lnSpc>
@@ -2743,7 +2922,6 @@
             <a:spcAft>
               <a:spcPct val="35000"/>
             </a:spcAft>
-            <a:buNone/>
           </a:pPr>
           <a:r>
             <a:rPr lang="en-US" sz="1800" kern="1200" dirty="0"/>
@@ -2837,7 +3015,7 @@
         </a:bodyPr>
         <a:lstStyle/>
         <a:p>
-          <a:pPr marL="0" lvl="0" indent="0" algn="ctr" defTabSz="933450">
+          <a:pPr lvl="0" algn="ctr" defTabSz="933450">
             <a:lnSpc>
               <a:spcPct val="90000"/>
             </a:lnSpc>
@@ -2847,7 +3025,6 @@
             <a:spcAft>
               <a:spcPct val="35000"/>
             </a:spcAft>
-            <a:buNone/>
           </a:pPr>
           <a:r>
             <a:rPr lang="en-US" sz="2100" kern="1200" dirty="0"/>
@@ -2916,7 +3093,7 @@
         </a:bodyPr>
         <a:lstStyle/>
         <a:p>
-          <a:pPr marL="0" lvl="0" indent="0" algn="l" defTabSz="800100">
+          <a:pPr lvl="0" algn="l" defTabSz="800100">
             <a:lnSpc>
               <a:spcPct val="90000"/>
             </a:lnSpc>
@@ -2926,7 +3103,6 @@
             <a:spcAft>
               <a:spcPct val="35000"/>
             </a:spcAft>
-            <a:buNone/>
           </a:pPr>
           <a:r>
             <a:rPr lang="en-US" sz="1800" kern="1200" dirty="0"/>
@@ -2995,7 +3171,7 @@
         </a:bodyPr>
         <a:lstStyle/>
         <a:p>
-          <a:pPr marL="0" lvl="0" indent="0" algn="l" defTabSz="800100">
+          <a:pPr lvl="0" algn="l" defTabSz="800100">
             <a:lnSpc>
               <a:spcPct val="90000"/>
             </a:lnSpc>
@@ -3005,7 +3181,6 @@
             <a:spcAft>
               <a:spcPct val="35000"/>
             </a:spcAft>
-            <a:buNone/>
           </a:pPr>
           <a:r>
             <a:rPr lang="en-US" sz="1800" kern="1200" dirty="0"/>
@@ -3099,7 +3274,7 @@
         </a:bodyPr>
         <a:lstStyle/>
         <a:p>
-          <a:pPr marL="0" lvl="0" indent="0" algn="ctr" defTabSz="933450">
+          <a:pPr lvl="0" algn="ctr" defTabSz="933450">
             <a:lnSpc>
               <a:spcPct val="90000"/>
             </a:lnSpc>
@@ -3109,7 +3284,6 @@
             <a:spcAft>
               <a:spcPct val="35000"/>
             </a:spcAft>
-            <a:buNone/>
           </a:pPr>
           <a:r>
             <a:rPr lang="en-US" sz="2100" kern="1200" dirty="0"/>
@@ -4596,7 +4770,7 @@
           <a:p>
             <a:fld id="{23CEAAF3-9831-450B-8D59-2C09DB96C8FC}" type="datetimeFigureOut">
               <a:rPr lang="en-US"/>
-              <a:t>11/12/2016</a:t>
+              <a:t>11/15/2016</a:t>
             </a:fld>
             <a:endParaRPr/>
           </a:p>
@@ -4761,7 +4935,7 @@
           <a:p>
             <a:fld id="{2D50CD79-FC16-4410-AB61-17F26E6D3BC8}" type="datetimeFigureOut">
               <a:rPr lang="en-US"/>
-              <a:t>11/12/2016</a:t>
+              <a:t>11/15/2016</a:t>
             </a:fld>
             <a:endParaRPr/>
           </a:p>
@@ -5408,7 +5582,7 @@
             <a:fld id="{402B9795-92DC-40DC-A1CA-9A4B349D7824}" type="datetimeFigureOut">
               <a:rPr lang="en-US" smtClean="0"/>
               <a:pPr/>
-              <a:t>11/12/2016</a:t>
+              <a:t>11/15/2016</a:t>
             </a:fld>
             <a:endParaRPr lang="en-US" dirty="0"/>
           </a:p>
@@ -5702,7 +5876,7 @@
           <a:p>
             <a:fld id="{402B9795-92DC-40DC-A1CA-9A4B349D7824}" type="datetimeFigureOut">
               <a:rPr lang="en-US"/>
-              <a:t>11/12/2016</a:t>
+              <a:t>11/15/2016</a:t>
             </a:fld>
             <a:endParaRPr/>
           </a:p>
@@ -5884,7 +6058,7 @@
           <a:p>
             <a:fld id="{402B9795-92DC-40DC-A1CA-9A4B349D7824}" type="datetimeFigureOut">
               <a:rPr lang="en-US"/>
-              <a:t>11/12/2016</a:t>
+              <a:t>11/15/2016</a:t>
             </a:fld>
             <a:endParaRPr/>
           </a:p>
@@ -6076,7 +6250,7 @@
           <a:p>
             <a:fld id="{402B9795-92DC-40DC-A1CA-9A4B349D7824}" type="datetimeFigureOut">
               <a:rPr lang="en-US"/>
-              <a:t>11/12/2016</a:t>
+              <a:t>11/15/2016</a:t>
             </a:fld>
             <a:endParaRPr/>
           </a:p>
@@ -6345,7 +6519,7 @@
           <a:p>
             <a:fld id="{402B9795-92DC-40DC-A1CA-9A4B349D7824}" type="datetimeFigureOut">
               <a:rPr lang="en-US"/>
-              <a:t>11/12/2016</a:t>
+              <a:t>11/15/2016</a:t>
             </a:fld>
             <a:endParaRPr/>
           </a:p>
@@ -7374,7 +7548,7 @@
           <a:p>
             <a:fld id="{402B9795-92DC-40DC-A1CA-9A4B349D7824}" type="datetimeFigureOut">
               <a:rPr lang="en-US"/>
-              <a:t>11/12/2016</a:t>
+              <a:t>11/15/2016</a:t>
             </a:fld>
             <a:endParaRPr/>
           </a:p>
@@ -7647,7 +7821,7 @@
           <a:p>
             <a:fld id="{402B9795-92DC-40DC-A1CA-9A4B349D7824}" type="datetimeFigureOut">
               <a:rPr lang="en-US"/>
-              <a:t>11/12/2016</a:t>
+              <a:t>11/15/2016</a:t>
             </a:fld>
             <a:endParaRPr/>
           </a:p>
@@ -8027,7 +8201,7 @@
           <a:p>
             <a:fld id="{402B9795-92DC-40DC-A1CA-9A4B349D7824}" type="datetimeFigureOut">
               <a:rPr lang="en-US"/>
-              <a:t>11/12/2016</a:t>
+              <a:t>11/15/2016</a:t>
             </a:fld>
             <a:endParaRPr/>
           </a:p>
@@ -8157,7 +8331,7 @@
           <a:p>
             <a:fld id="{402B9795-92DC-40DC-A1CA-9A4B349D7824}" type="datetimeFigureOut">
               <a:rPr lang="en-US"/>
-              <a:t>11/12/2016</a:t>
+              <a:t>11/15/2016</a:t>
             </a:fld>
             <a:endParaRPr/>
           </a:p>
@@ -8264,7 +8438,7 @@
           <a:p>
             <a:fld id="{402B9795-92DC-40DC-A1CA-9A4B349D7824}" type="datetimeFigureOut">
               <a:rPr lang="en-US"/>
-              <a:t>11/12/2016</a:t>
+              <a:t>11/15/2016</a:t>
             </a:fld>
             <a:endParaRPr/>
           </a:p>
@@ -8555,7 +8729,7 @@
           <a:p>
             <a:fld id="{402B9795-92DC-40DC-A1CA-9A4B349D7824}" type="datetimeFigureOut">
               <a:rPr lang="en-US"/>
-              <a:t>11/12/2016</a:t>
+              <a:t>11/15/2016</a:t>
             </a:fld>
             <a:endParaRPr/>
           </a:p>
@@ -8781,7 +8955,7 @@
             <a:fld id="{402B9795-92DC-40DC-A1CA-9A4B349D7824}" type="datetimeFigureOut">
               <a:rPr lang="en-US" smtClean="0"/>
               <a:pPr/>
-              <a:t>11/12/2016</a:t>
+              <a:t>11/15/2016</a:t>
             </a:fld>
             <a:endParaRPr lang="en-US"/>
           </a:p>
@@ -9642,6 +9816,10 @@
             <a:br>
               <a:rPr lang="en-US" dirty="0"/>
             </a:br>
+            <a:r>
+              <a:rPr lang="en-US" dirty="0"/>
+              <a:t/>
+            </a:r>
             <a:br>
               <a:rPr lang="en-US" dirty="0"/>
             </a:br>
@@ -9798,28 +9976,28 @@
                 <a:gridCol w="3017220">
                   <a:extLst>
                     <a:ext uri="{9D8B030D-6E8A-4147-A177-3AD203B41FA5}">
-                      <a16:colId xmlns:a16="http://schemas.microsoft.com/office/drawing/2014/main" val="20000"/>
+                      <a16:colId xmlns:a16="http://schemas.microsoft.com/office/drawing/2014/main" xmlns="" val="20000"/>
                     </a:ext>
                   </a:extLst>
                 </a:gridCol>
                 <a:gridCol w="2321155">
                   <a:extLst>
                     <a:ext uri="{9D8B030D-6E8A-4147-A177-3AD203B41FA5}">
-                      <a16:colId xmlns:a16="http://schemas.microsoft.com/office/drawing/2014/main" val="20001"/>
+                      <a16:colId xmlns:a16="http://schemas.microsoft.com/office/drawing/2014/main" xmlns="" val="20001"/>
                     </a:ext>
                   </a:extLst>
                 </a:gridCol>
                 <a:gridCol w="2321155">
                   <a:extLst>
                     <a:ext uri="{9D8B030D-6E8A-4147-A177-3AD203B41FA5}">
-                      <a16:colId xmlns:a16="http://schemas.microsoft.com/office/drawing/2014/main" val="20002"/>
+                      <a16:colId xmlns:a16="http://schemas.microsoft.com/office/drawing/2014/main" xmlns="" val="20002"/>
                     </a:ext>
                   </a:extLst>
                 </a:gridCol>
                 <a:gridCol w="2321155">
                   <a:extLst>
                     <a:ext uri="{9D8B030D-6E8A-4147-A177-3AD203B41FA5}">
-                      <a16:colId xmlns:a16="http://schemas.microsoft.com/office/drawing/2014/main" val="3069841702"/>
+                      <a16:colId xmlns:a16="http://schemas.microsoft.com/office/drawing/2014/main" xmlns="" val="3069841702"/>
                     </a:ext>
                   </a:extLst>
                 </a:gridCol>
@@ -9882,7 +10060,7 @@
                 </a:tc>
                 <a:extLst>
                   <a:ext uri="{0D108BD9-81ED-4DB2-BD59-A6C34878D82A}">
-                    <a16:rowId xmlns:a16="http://schemas.microsoft.com/office/drawing/2014/main" val="10000"/>
+                    <a16:rowId xmlns:a16="http://schemas.microsoft.com/office/drawing/2014/main" xmlns="" val="10000"/>
                   </a:ext>
                 </a:extLst>
               </a:tr>
@@ -9992,7 +10170,7 @@
                 </a:tc>
                 <a:extLst>
                   <a:ext uri="{0D108BD9-81ED-4DB2-BD59-A6C34878D82A}">
-                    <a16:rowId xmlns:a16="http://schemas.microsoft.com/office/drawing/2014/main" val="10001"/>
+                    <a16:rowId xmlns:a16="http://schemas.microsoft.com/office/drawing/2014/main" xmlns="" val="10001"/>
                   </a:ext>
                 </a:extLst>
               </a:tr>
@@ -10062,7 +10240,7 @@
                 </a:tc>
                 <a:extLst>
                   <a:ext uri="{0D108BD9-81ED-4DB2-BD59-A6C34878D82A}">
-                    <a16:rowId xmlns:a16="http://schemas.microsoft.com/office/drawing/2014/main" val="10002"/>
+                    <a16:rowId xmlns:a16="http://schemas.microsoft.com/office/drawing/2014/main" xmlns="" val="10002"/>
                   </a:ext>
                 </a:extLst>
               </a:tr>
@@ -10143,7 +10321,7 @@
                 </a:tc>
                 <a:extLst>
                   <a:ext uri="{0D108BD9-81ED-4DB2-BD59-A6C34878D82A}">
-                    <a16:rowId xmlns:a16="http://schemas.microsoft.com/office/drawing/2014/main" val="10003"/>
+                    <a16:rowId xmlns:a16="http://schemas.microsoft.com/office/drawing/2014/main" xmlns="" val="10003"/>
                   </a:ext>
                 </a:extLst>
               </a:tr>
@@ -10217,7 +10395,7 @@
                 </a:tc>
                 <a:extLst>
                   <a:ext uri="{0D108BD9-81ED-4DB2-BD59-A6C34878D82A}">
-                    <a16:rowId xmlns:a16="http://schemas.microsoft.com/office/drawing/2014/main" val="2741463184"/>
+                    <a16:rowId xmlns:a16="http://schemas.microsoft.com/office/drawing/2014/main" xmlns="" val="2741463184"/>
                   </a:ext>
                 </a:extLst>
               </a:tr>
@@ -10287,7 +10465,7 @@
                 </a:tc>
                 <a:extLst>
                   <a:ext uri="{0D108BD9-81ED-4DB2-BD59-A6C34878D82A}">
-                    <a16:rowId xmlns:a16="http://schemas.microsoft.com/office/drawing/2014/main" val="3749122042"/>
+                    <a16:rowId xmlns:a16="http://schemas.microsoft.com/office/drawing/2014/main" xmlns="" val="3749122042"/>
                   </a:ext>
                 </a:extLst>
               </a:tr>
@@ -10476,6 +10654,14 @@
             </a:r>
           </a:p>
           <a:p>
+            <a:r>
+              <a:rPr lang="en-US" dirty="0" smtClean="0"/>
+              <a:t>The Chrome App “Postman” was a very useful resource in testing responses from </a:t>
+            </a:r>
+            <a:r>
+              <a:rPr lang="en-US" smtClean="0"/>
+              <a:t>our chosen API</a:t>
+            </a:r>
             <a:endParaRPr lang="en-US" dirty="0"/>
           </a:p>
         </p:txBody>
@@ -11317,6 +11503,141 @@
 </file>
 
 <file path=customXml/item1.xml><?xml version="1.0" encoding="utf-8"?>
+<?mso-contentType ?>
+<FormTemplates xmlns="http://schemas.microsoft.com/sharepoint/v3/contenttype/forms">
+  <Display>DocumentLibraryForm</Display>
+  <Edit>AssetEditForm</Edit>
+  <New>DocumentLibraryForm</New>
+</FormTemplates>
+</file>
+
+<file path=customXml/item2.xml><?xml version="1.0" encoding="utf-8"?>
+<p:properties xmlns:p="http://schemas.microsoft.com/office/2006/metadata/properties" xmlns:xsi="http://www.w3.org/2001/XMLSchema-instance" xmlns:pc="http://schemas.microsoft.com/office/infopath/2007/PartnerControls">
+  <documentManagement>
+    <APDescription xmlns="4873beb7-5857-4685-be1f-d57550cc96cc" xsi:nil="true"/>
+    <AssetExpire xmlns="4873beb7-5857-4685-be1f-d57550cc96cc">2029-01-01T08:00:00+00:00</AssetExpire>
+    <CampaignTagsTaxHTField0 xmlns="4873beb7-5857-4685-be1f-d57550cc96cc">
+      <Terms xmlns="http://schemas.microsoft.com/office/infopath/2007/PartnerControls"/>
+    </CampaignTagsTaxHTField0>
+    <IntlLangReviewDate xmlns="4873beb7-5857-4685-be1f-d57550cc96cc" xsi:nil="true"/>
+    <TPFriendlyName xmlns="4873beb7-5857-4685-be1f-d57550cc96cc" xsi:nil="true"/>
+    <IntlLangReview xmlns="4873beb7-5857-4685-be1f-d57550cc96cc">false</IntlLangReview>
+    <LocLastLocAttemptVersionLookup xmlns="4873beb7-5857-4685-be1f-d57550cc96cc">855024</LocLastLocAttemptVersionLookup>
+    <PolicheckWords xmlns="4873beb7-5857-4685-be1f-d57550cc96cc" xsi:nil="true"/>
+    <SubmitterId xmlns="4873beb7-5857-4685-be1f-d57550cc96cc" xsi:nil="true"/>
+    <AcquiredFrom xmlns="4873beb7-5857-4685-be1f-d57550cc96cc">Internal MS</AcquiredFrom>
+    <EditorialStatus xmlns="4873beb7-5857-4685-be1f-d57550cc96cc">Complete</EditorialStatus>
+    <Markets xmlns="4873beb7-5857-4685-be1f-d57550cc96cc"/>
+    <OriginAsset xmlns="4873beb7-5857-4685-be1f-d57550cc96cc" xsi:nil="true"/>
+    <AssetStart xmlns="4873beb7-5857-4685-be1f-d57550cc96cc">2012-08-31T08:50:00+00:00</AssetStart>
+    <FriendlyTitle xmlns="4873beb7-5857-4685-be1f-d57550cc96cc" xsi:nil="true"/>
+    <MarketSpecific xmlns="4873beb7-5857-4685-be1f-d57550cc96cc">false</MarketSpecific>
+    <TPNamespace xmlns="4873beb7-5857-4685-be1f-d57550cc96cc" xsi:nil="true"/>
+    <PublishStatusLookup xmlns="4873beb7-5857-4685-be1f-d57550cc96cc">
+      <Value>1616423</Value>
+    </PublishStatusLookup>
+    <APAuthor xmlns="4873beb7-5857-4685-be1f-d57550cc96cc">
+      <UserInfo>
+        <DisplayName>REDMOND\kristaa</DisplayName>
+        <AccountId>136</AccountId>
+        <AccountType/>
+      </UserInfo>
+    </APAuthor>
+    <TPCommandLine xmlns="4873beb7-5857-4685-be1f-d57550cc96cc" xsi:nil="true"/>
+    <IntlLangReviewer xmlns="4873beb7-5857-4685-be1f-d57550cc96cc" xsi:nil="true"/>
+    <OpenTemplate xmlns="4873beb7-5857-4685-be1f-d57550cc96cc">true</OpenTemplate>
+    <CSXSubmissionDate xmlns="4873beb7-5857-4685-be1f-d57550cc96cc" xsi:nil="true"/>
+    <TaxCatchAll xmlns="4873beb7-5857-4685-be1f-d57550cc96cc"/>
+    <Manager xmlns="4873beb7-5857-4685-be1f-d57550cc96cc" xsi:nil="true"/>
+    <NumericId xmlns="4873beb7-5857-4685-be1f-d57550cc96cc" xsi:nil="true"/>
+    <ParentAssetId xmlns="4873beb7-5857-4685-be1f-d57550cc96cc" xsi:nil="true"/>
+    <OriginalSourceMarket xmlns="4873beb7-5857-4685-be1f-d57550cc96cc" xsi:nil="true"/>
+    <ApprovalStatus xmlns="4873beb7-5857-4685-be1f-d57550cc96cc">InProgress</ApprovalStatus>
+    <TPComponent xmlns="4873beb7-5857-4685-be1f-d57550cc96cc" xsi:nil="true"/>
+    <EditorialTags xmlns="4873beb7-5857-4685-be1f-d57550cc96cc" xsi:nil="true"/>
+    <TPExecutable xmlns="4873beb7-5857-4685-be1f-d57550cc96cc" xsi:nil="true"/>
+    <TPLaunchHelpLink xmlns="4873beb7-5857-4685-be1f-d57550cc96cc" xsi:nil="true"/>
+    <LocComments xmlns="4873beb7-5857-4685-be1f-d57550cc96cc" xsi:nil="true"/>
+    <LocRecommendedHandoff xmlns="4873beb7-5857-4685-be1f-d57550cc96cc" xsi:nil="true"/>
+    <SourceTitle xmlns="4873beb7-5857-4685-be1f-d57550cc96cc" xsi:nil="true"/>
+    <CSXUpdate xmlns="4873beb7-5857-4685-be1f-d57550cc96cc">false</CSXUpdate>
+    <IntlLocPriority xmlns="4873beb7-5857-4685-be1f-d57550cc96cc" xsi:nil="true"/>
+    <UAProjectedTotalWords xmlns="4873beb7-5857-4685-be1f-d57550cc96cc" xsi:nil="true"/>
+    <AssetType xmlns="4873beb7-5857-4685-be1f-d57550cc96cc">TP</AssetType>
+    <MachineTranslated xmlns="4873beb7-5857-4685-be1f-d57550cc96cc">false</MachineTranslated>
+    <OutputCachingOn xmlns="4873beb7-5857-4685-be1f-d57550cc96cc">false</OutputCachingOn>
+    <TemplateStatus xmlns="4873beb7-5857-4685-be1f-d57550cc96cc">Complete</TemplateStatus>
+    <IsSearchable xmlns="4873beb7-5857-4685-be1f-d57550cc96cc">true</IsSearchable>
+    <ContentItem xmlns="4873beb7-5857-4685-be1f-d57550cc96cc" xsi:nil="true"/>
+    <HandoffToMSDN xmlns="4873beb7-5857-4685-be1f-d57550cc96cc" xsi:nil="true"/>
+    <ShowIn xmlns="4873beb7-5857-4685-be1f-d57550cc96cc">Show everywhere</ShowIn>
+    <ThumbnailAssetId xmlns="4873beb7-5857-4685-be1f-d57550cc96cc" xsi:nil="true"/>
+    <UALocComments xmlns="4873beb7-5857-4685-be1f-d57550cc96cc" xsi:nil="true"/>
+    <UALocRecommendation xmlns="4873beb7-5857-4685-be1f-d57550cc96cc">Localize</UALocRecommendation>
+    <LastModifiedDateTime xmlns="4873beb7-5857-4685-be1f-d57550cc96cc" xsi:nil="true"/>
+    <LegacyData xmlns="4873beb7-5857-4685-be1f-d57550cc96cc" xsi:nil="true"/>
+    <LocManualTestRequired xmlns="4873beb7-5857-4685-be1f-d57550cc96cc">false</LocManualTestRequired>
+    <LocMarketGroupTiers2 xmlns="4873beb7-5857-4685-be1f-d57550cc96cc" xsi:nil="true"/>
+    <ClipArtFilename xmlns="4873beb7-5857-4685-be1f-d57550cc96cc" xsi:nil="true"/>
+    <TPApplication xmlns="4873beb7-5857-4685-be1f-d57550cc96cc" xsi:nil="true"/>
+    <CSXHash xmlns="4873beb7-5857-4685-be1f-d57550cc96cc" xsi:nil="true"/>
+    <DirectSourceMarket xmlns="4873beb7-5857-4685-be1f-d57550cc96cc" xsi:nil="true"/>
+    <PrimaryImageGen xmlns="4873beb7-5857-4685-be1f-d57550cc96cc">true</PrimaryImageGen>
+    <PlannedPubDate xmlns="4873beb7-5857-4685-be1f-d57550cc96cc" xsi:nil="true"/>
+    <CSXSubmissionMarket xmlns="4873beb7-5857-4685-be1f-d57550cc96cc" xsi:nil="true"/>
+    <Downloads xmlns="4873beb7-5857-4685-be1f-d57550cc96cc">0</Downloads>
+    <ArtSampleDocs xmlns="4873beb7-5857-4685-be1f-d57550cc96cc" xsi:nil="true"/>
+    <TrustLevel xmlns="4873beb7-5857-4685-be1f-d57550cc96cc">1 Microsoft Managed Content</TrustLevel>
+    <BlockPublish xmlns="4873beb7-5857-4685-be1f-d57550cc96cc">false</BlockPublish>
+    <TPLaunchHelpLinkType xmlns="4873beb7-5857-4685-be1f-d57550cc96cc">Template</TPLaunchHelpLinkType>
+    <LocalizationTagsTaxHTField0 xmlns="4873beb7-5857-4685-be1f-d57550cc96cc">
+      <Terms xmlns="http://schemas.microsoft.com/office/infopath/2007/PartnerControls"/>
+    </LocalizationTagsTaxHTField0>
+    <BusinessGroup xmlns="4873beb7-5857-4685-be1f-d57550cc96cc" xsi:nil="true"/>
+    <Providers xmlns="4873beb7-5857-4685-be1f-d57550cc96cc" xsi:nil="true"/>
+    <TemplateTemplateType xmlns="4873beb7-5857-4685-be1f-d57550cc96cc">PowerPoint Presentation Template</TemplateTemplateType>
+    <TimesCloned xmlns="4873beb7-5857-4685-be1f-d57550cc96cc" xsi:nil="true"/>
+    <TPAppVersion xmlns="4873beb7-5857-4685-be1f-d57550cc96cc" xsi:nil="true"/>
+    <VoteCount xmlns="4873beb7-5857-4685-be1f-d57550cc96cc" xsi:nil="true"/>
+    <AverageRating xmlns="4873beb7-5857-4685-be1f-d57550cc96cc" xsi:nil="true"/>
+    <FeatureTagsTaxHTField0 xmlns="4873beb7-5857-4685-be1f-d57550cc96cc">
+      <Terms xmlns="http://schemas.microsoft.com/office/infopath/2007/PartnerControls"/>
+    </FeatureTagsTaxHTField0>
+    <Provider xmlns="4873beb7-5857-4685-be1f-d57550cc96cc" xsi:nil="true"/>
+    <UACurrentWords xmlns="4873beb7-5857-4685-be1f-d57550cc96cc" xsi:nil="true"/>
+    <AssetId xmlns="4873beb7-5857-4685-be1f-d57550cc96cc">TP103431361</AssetId>
+    <TPClientViewer xmlns="4873beb7-5857-4685-be1f-d57550cc96cc" xsi:nil="true"/>
+    <DSATActionTaken xmlns="4873beb7-5857-4685-be1f-d57550cc96cc" xsi:nil="true"/>
+    <APEditor xmlns="4873beb7-5857-4685-be1f-d57550cc96cc">
+      <UserInfo>
+        <DisplayName/>
+        <AccountId xsi:nil="true"/>
+        <AccountType/>
+      </UserInfo>
+    </APEditor>
+    <TPInstallLocation xmlns="4873beb7-5857-4685-be1f-d57550cc96cc" xsi:nil="true"/>
+    <OOCacheId xmlns="4873beb7-5857-4685-be1f-d57550cc96cc" xsi:nil="true"/>
+    <IsDeleted xmlns="4873beb7-5857-4685-be1f-d57550cc96cc">false</IsDeleted>
+    <PublishTargets xmlns="4873beb7-5857-4685-be1f-d57550cc96cc">OfficeOnlineVNext</PublishTargets>
+    <ApprovalLog xmlns="4873beb7-5857-4685-be1f-d57550cc96cc" xsi:nil="true"/>
+    <BugNumber xmlns="4873beb7-5857-4685-be1f-d57550cc96cc" xsi:nil="true"/>
+    <CrawlForDependencies xmlns="4873beb7-5857-4685-be1f-d57550cc96cc">false</CrawlForDependencies>
+    <InternalTagsTaxHTField0 xmlns="4873beb7-5857-4685-be1f-d57550cc96cc">
+      <Terms xmlns="http://schemas.microsoft.com/office/infopath/2007/PartnerControls"/>
+    </InternalTagsTaxHTField0>
+    <LastHandOff xmlns="4873beb7-5857-4685-be1f-d57550cc96cc" xsi:nil="true"/>
+    <Milestone xmlns="4873beb7-5857-4685-be1f-d57550cc96cc" xsi:nil="true"/>
+    <OriginalRelease xmlns="4873beb7-5857-4685-be1f-d57550cc96cc">15</OriginalRelease>
+    <RecommendationsModifier xmlns="4873beb7-5857-4685-be1f-d57550cc96cc" xsi:nil="true"/>
+    <ScenarioTagsTaxHTField0 xmlns="4873beb7-5857-4685-be1f-d57550cc96cc">
+      <Terms xmlns="http://schemas.microsoft.com/office/infopath/2007/PartnerControls"/>
+    </ScenarioTagsTaxHTField0>
+    <UANotes xmlns="4873beb7-5857-4685-be1f-d57550cc96cc" xsi:nil="true"/>
+  </documentManagement>
+</p:properties>
+</file>
+
+<file path=customXml/item3.xml><?xml version="1.0" encoding="utf-8"?>
 <ct:contentTypeSchema xmlns:ct="http://schemas.microsoft.com/office/2006/metadata/contentType" xmlns:ma="http://schemas.microsoft.com/office/2006/metadata/properties/metaAttributes" ct:_="" ma:_="" ma:contentTypeName="TemplateFile" ma:contentTypeID="0x0101006EDDDB5EE6D98C44930B742096920B300400F5B6D36B3EF94B4E9A635CDF2A18F5B8" ma:contentTypeVersion="72" ma:contentTypeDescription="Create a new document." ma:contentTypeScope="" ma:versionID="a23e56308344d904b51738559c3d67c9">
   <xsd:schema xmlns:xsd="http://www.w3.org/2001/XMLSchema" xmlns:xs="http://www.w3.org/2001/XMLSchema" xmlns:p="http://schemas.microsoft.com/office/2006/metadata/properties" xmlns:ns2="4873beb7-5857-4685-be1f-d57550cc96cc" targetNamespace="http://schemas.microsoft.com/office/2006/metadata/properties" ma:root="true" ma:fieldsID="cd0908cc4600e77bf5da051303e00c8d" ns2:_="">
     <xsd:import namespace="4873beb7-5857-4685-be1f-d57550cc96cc"/>
@@ -12356,155 +12677,10 @@
 </ct:contentTypeSchema>
 </file>
 
-<file path=customXml/item2.xml><?xml version="1.0" encoding="utf-8"?>
-<p:properties xmlns:p="http://schemas.microsoft.com/office/2006/metadata/properties" xmlns:xsi="http://www.w3.org/2001/XMLSchema-instance" xmlns:pc="http://schemas.microsoft.com/office/infopath/2007/PartnerControls">
-  <documentManagement>
-    <APDescription xmlns="4873beb7-5857-4685-be1f-d57550cc96cc" xsi:nil="true"/>
-    <AssetExpire xmlns="4873beb7-5857-4685-be1f-d57550cc96cc">2029-01-01T08:00:00+00:00</AssetExpire>
-    <CampaignTagsTaxHTField0 xmlns="4873beb7-5857-4685-be1f-d57550cc96cc">
-      <Terms xmlns="http://schemas.microsoft.com/office/infopath/2007/PartnerControls"/>
-    </CampaignTagsTaxHTField0>
-    <IntlLangReviewDate xmlns="4873beb7-5857-4685-be1f-d57550cc96cc" xsi:nil="true"/>
-    <TPFriendlyName xmlns="4873beb7-5857-4685-be1f-d57550cc96cc" xsi:nil="true"/>
-    <IntlLangReview xmlns="4873beb7-5857-4685-be1f-d57550cc96cc">false</IntlLangReview>
-    <LocLastLocAttemptVersionLookup xmlns="4873beb7-5857-4685-be1f-d57550cc96cc">855024</LocLastLocAttemptVersionLookup>
-    <PolicheckWords xmlns="4873beb7-5857-4685-be1f-d57550cc96cc" xsi:nil="true"/>
-    <SubmitterId xmlns="4873beb7-5857-4685-be1f-d57550cc96cc" xsi:nil="true"/>
-    <AcquiredFrom xmlns="4873beb7-5857-4685-be1f-d57550cc96cc">Internal MS</AcquiredFrom>
-    <EditorialStatus xmlns="4873beb7-5857-4685-be1f-d57550cc96cc">Complete</EditorialStatus>
-    <Markets xmlns="4873beb7-5857-4685-be1f-d57550cc96cc"/>
-    <OriginAsset xmlns="4873beb7-5857-4685-be1f-d57550cc96cc" xsi:nil="true"/>
-    <AssetStart xmlns="4873beb7-5857-4685-be1f-d57550cc96cc">2012-08-31T08:50:00+00:00</AssetStart>
-    <FriendlyTitle xmlns="4873beb7-5857-4685-be1f-d57550cc96cc" xsi:nil="true"/>
-    <MarketSpecific xmlns="4873beb7-5857-4685-be1f-d57550cc96cc">false</MarketSpecific>
-    <TPNamespace xmlns="4873beb7-5857-4685-be1f-d57550cc96cc" xsi:nil="true"/>
-    <PublishStatusLookup xmlns="4873beb7-5857-4685-be1f-d57550cc96cc">
-      <Value>1616423</Value>
-    </PublishStatusLookup>
-    <APAuthor xmlns="4873beb7-5857-4685-be1f-d57550cc96cc">
-      <UserInfo>
-        <DisplayName>REDMOND\kristaa</DisplayName>
-        <AccountId>136</AccountId>
-        <AccountType/>
-      </UserInfo>
-    </APAuthor>
-    <TPCommandLine xmlns="4873beb7-5857-4685-be1f-d57550cc96cc" xsi:nil="true"/>
-    <IntlLangReviewer xmlns="4873beb7-5857-4685-be1f-d57550cc96cc" xsi:nil="true"/>
-    <OpenTemplate xmlns="4873beb7-5857-4685-be1f-d57550cc96cc">true</OpenTemplate>
-    <CSXSubmissionDate xmlns="4873beb7-5857-4685-be1f-d57550cc96cc" xsi:nil="true"/>
-    <TaxCatchAll xmlns="4873beb7-5857-4685-be1f-d57550cc96cc"/>
-    <Manager xmlns="4873beb7-5857-4685-be1f-d57550cc96cc" xsi:nil="true"/>
-    <NumericId xmlns="4873beb7-5857-4685-be1f-d57550cc96cc" xsi:nil="true"/>
-    <ParentAssetId xmlns="4873beb7-5857-4685-be1f-d57550cc96cc" xsi:nil="true"/>
-    <OriginalSourceMarket xmlns="4873beb7-5857-4685-be1f-d57550cc96cc" xsi:nil="true"/>
-    <ApprovalStatus xmlns="4873beb7-5857-4685-be1f-d57550cc96cc">InProgress</ApprovalStatus>
-    <TPComponent xmlns="4873beb7-5857-4685-be1f-d57550cc96cc" xsi:nil="true"/>
-    <EditorialTags xmlns="4873beb7-5857-4685-be1f-d57550cc96cc" xsi:nil="true"/>
-    <TPExecutable xmlns="4873beb7-5857-4685-be1f-d57550cc96cc" xsi:nil="true"/>
-    <TPLaunchHelpLink xmlns="4873beb7-5857-4685-be1f-d57550cc96cc" xsi:nil="true"/>
-    <LocComments xmlns="4873beb7-5857-4685-be1f-d57550cc96cc" xsi:nil="true"/>
-    <LocRecommendedHandoff xmlns="4873beb7-5857-4685-be1f-d57550cc96cc" xsi:nil="true"/>
-    <SourceTitle xmlns="4873beb7-5857-4685-be1f-d57550cc96cc" xsi:nil="true"/>
-    <CSXUpdate xmlns="4873beb7-5857-4685-be1f-d57550cc96cc">false</CSXUpdate>
-    <IntlLocPriority xmlns="4873beb7-5857-4685-be1f-d57550cc96cc" xsi:nil="true"/>
-    <UAProjectedTotalWords xmlns="4873beb7-5857-4685-be1f-d57550cc96cc" xsi:nil="true"/>
-    <AssetType xmlns="4873beb7-5857-4685-be1f-d57550cc96cc">TP</AssetType>
-    <MachineTranslated xmlns="4873beb7-5857-4685-be1f-d57550cc96cc">false</MachineTranslated>
-    <OutputCachingOn xmlns="4873beb7-5857-4685-be1f-d57550cc96cc">false</OutputCachingOn>
-    <TemplateStatus xmlns="4873beb7-5857-4685-be1f-d57550cc96cc">Complete</TemplateStatus>
-    <IsSearchable xmlns="4873beb7-5857-4685-be1f-d57550cc96cc">true</IsSearchable>
-    <ContentItem xmlns="4873beb7-5857-4685-be1f-d57550cc96cc" xsi:nil="true"/>
-    <HandoffToMSDN xmlns="4873beb7-5857-4685-be1f-d57550cc96cc" xsi:nil="true"/>
-    <ShowIn xmlns="4873beb7-5857-4685-be1f-d57550cc96cc">Show everywhere</ShowIn>
-    <ThumbnailAssetId xmlns="4873beb7-5857-4685-be1f-d57550cc96cc" xsi:nil="true"/>
-    <UALocComments xmlns="4873beb7-5857-4685-be1f-d57550cc96cc" xsi:nil="true"/>
-    <UALocRecommendation xmlns="4873beb7-5857-4685-be1f-d57550cc96cc">Localize</UALocRecommendation>
-    <LastModifiedDateTime xmlns="4873beb7-5857-4685-be1f-d57550cc96cc" xsi:nil="true"/>
-    <LegacyData xmlns="4873beb7-5857-4685-be1f-d57550cc96cc" xsi:nil="true"/>
-    <LocManualTestRequired xmlns="4873beb7-5857-4685-be1f-d57550cc96cc">false</LocManualTestRequired>
-    <LocMarketGroupTiers2 xmlns="4873beb7-5857-4685-be1f-d57550cc96cc" xsi:nil="true"/>
-    <ClipArtFilename xmlns="4873beb7-5857-4685-be1f-d57550cc96cc" xsi:nil="true"/>
-    <TPApplication xmlns="4873beb7-5857-4685-be1f-d57550cc96cc" xsi:nil="true"/>
-    <CSXHash xmlns="4873beb7-5857-4685-be1f-d57550cc96cc" xsi:nil="true"/>
-    <DirectSourceMarket xmlns="4873beb7-5857-4685-be1f-d57550cc96cc" xsi:nil="true"/>
-    <PrimaryImageGen xmlns="4873beb7-5857-4685-be1f-d57550cc96cc">true</PrimaryImageGen>
-    <PlannedPubDate xmlns="4873beb7-5857-4685-be1f-d57550cc96cc" xsi:nil="true"/>
-    <CSXSubmissionMarket xmlns="4873beb7-5857-4685-be1f-d57550cc96cc" xsi:nil="true"/>
-    <Downloads xmlns="4873beb7-5857-4685-be1f-d57550cc96cc">0</Downloads>
-    <ArtSampleDocs xmlns="4873beb7-5857-4685-be1f-d57550cc96cc" xsi:nil="true"/>
-    <TrustLevel xmlns="4873beb7-5857-4685-be1f-d57550cc96cc">1 Microsoft Managed Content</TrustLevel>
-    <BlockPublish xmlns="4873beb7-5857-4685-be1f-d57550cc96cc">false</BlockPublish>
-    <TPLaunchHelpLinkType xmlns="4873beb7-5857-4685-be1f-d57550cc96cc">Template</TPLaunchHelpLinkType>
-    <LocalizationTagsTaxHTField0 xmlns="4873beb7-5857-4685-be1f-d57550cc96cc">
-      <Terms xmlns="http://schemas.microsoft.com/office/infopath/2007/PartnerControls"/>
-    </LocalizationTagsTaxHTField0>
-    <BusinessGroup xmlns="4873beb7-5857-4685-be1f-d57550cc96cc" xsi:nil="true"/>
-    <Providers xmlns="4873beb7-5857-4685-be1f-d57550cc96cc" xsi:nil="true"/>
-    <TemplateTemplateType xmlns="4873beb7-5857-4685-be1f-d57550cc96cc">PowerPoint Presentation Template</TemplateTemplateType>
-    <TimesCloned xmlns="4873beb7-5857-4685-be1f-d57550cc96cc" xsi:nil="true"/>
-    <TPAppVersion xmlns="4873beb7-5857-4685-be1f-d57550cc96cc" xsi:nil="true"/>
-    <VoteCount xmlns="4873beb7-5857-4685-be1f-d57550cc96cc" xsi:nil="true"/>
-    <AverageRating xmlns="4873beb7-5857-4685-be1f-d57550cc96cc" xsi:nil="true"/>
-    <FeatureTagsTaxHTField0 xmlns="4873beb7-5857-4685-be1f-d57550cc96cc">
-      <Terms xmlns="http://schemas.microsoft.com/office/infopath/2007/PartnerControls"/>
-    </FeatureTagsTaxHTField0>
-    <Provider xmlns="4873beb7-5857-4685-be1f-d57550cc96cc" xsi:nil="true"/>
-    <UACurrentWords xmlns="4873beb7-5857-4685-be1f-d57550cc96cc" xsi:nil="true"/>
-    <AssetId xmlns="4873beb7-5857-4685-be1f-d57550cc96cc">TP103431361</AssetId>
-    <TPClientViewer xmlns="4873beb7-5857-4685-be1f-d57550cc96cc" xsi:nil="true"/>
-    <DSATActionTaken xmlns="4873beb7-5857-4685-be1f-d57550cc96cc" xsi:nil="true"/>
-    <APEditor xmlns="4873beb7-5857-4685-be1f-d57550cc96cc">
-      <UserInfo>
-        <DisplayName/>
-        <AccountId xsi:nil="true"/>
-        <AccountType/>
-      </UserInfo>
-    </APEditor>
-    <TPInstallLocation xmlns="4873beb7-5857-4685-be1f-d57550cc96cc" xsi:nil="true"/>
-    <OOCacheId xmlns="4873beb7-5857-4685-be1f-d57550cc96cc" xsi:nil="true"/>
-    <IsDeleted xmlns="4873beb7-5857-4685-be1f-d57550cc96cc">false</IsDeleted>
-    <PublishTargets xmlns="4873beb7-5857-4685-be1f-d57550cc96cc">OfficeOnlineVNext</PublishTargets>
-    <ApprovalLog xmlns="4873beb7-5857-4685-be1f-d57550cc96cc" xsi:nil="true"/>
-    <BugNumber xmlns="4873beb7-5857-4685-be1f-d57550cc96cc" xsi:nil="true"/>
-    <CrawlForDependencies xmlns="4873beb7-5857-4685-be1f-d57550cc96cc">false</CrawlForDependencies>
-    <InternalTagsTaxHTField0 xmlns="4873beb7-5857-4685-be1f-d57550cc96cc">
-      <Terms xmlns="http://schemas.microsoft.com/office/infopath/2007/PartnerControls"/>
-    </InternalTagsTaxHTField0>
-    <LastHandOff xmlns="4873beb7-5857-4685-be1f-d57550cc96cc" xsi:nil="true"/>
-    <Milestone xmlns="4873beb7-5857-4685-be1f-d57550cc96cc" xsi:nil="true"/>
-    <OriginalRelease xmlns="4873beb7-5857-4685-be1f-d57550cc96cc">15</OriginalRelease>
-    <RecommendationsModifier xmlns="4873beb7-5857-4685-be1f-d57550cc96cc" xsi:nil="true"/>
-    <ScenarioTagsTaxHTField0 xmlns="4873beb7-5857-4685-be1f-d57550cc96cc">
-      <Terms xmlns="http://schemas.microsoft.com/office/infopath/2007/PartnerControls"/>
-    </ScenarioTagsTaxHTField0>
-    <UANotes xmlns="4873beb7-5857-4685-be1f-d57550cc96cc" xsi:nil="true"/>
-  </documentManagement>
-</p:properties>
-</file>
-
-<file path=customXml/item3.xml><?xml version="1.0" encoding="utf-8"?>
-<?mso-contentType ?>
-<FormTemplates xmlns="http://schemas.microsoft.com/sharepoint/v3/contenttype/forms">
-  <Display>DocumentLibraryForm</Display>
-  <Edit>AssetEditForm</Edit>
-  <New>DocumentLibraryForm</New>
-</FormTemplates>
-</file>
-
 <file path=customXml/itemProps1.xml><?xml version="1.0" encoding="utf-8"?>
-<ds:datastoreItem xmlns:ds="http://schemas.openxmlformats.org/officeDocument/2006/customXml" ds:itemID="{28C8B9CA-0273-4370-889A-FC05DA5C2FA5}">
+<ds:datastoreItem xmlns:ds="http://schemas.openxmlformats.org/officeDocument/2006/customXml" ds:itemID="{561E720F-F05D-4536-9C34-0CFCED65D3B7}">
   <ds:schemaRefs>
-    <ds:schemaRef ds:uri="http://schemas.microsoft.com/office/2006/metadata/contentType"/>
-    <ds:schemaRef ds:uri="http://schemas.microsoft.com/office/2006/metadata/properties/metaAttributes"/>
-    <ds:schemaRef ds:uri="http://www.w3.org/2001/XMLSchema"/>
-    <ds:schemaRef ds:uri="http://schemas.microsoft.com/office/2006/metadata/properties"/>
-    <ds:schemaRef ds:uri="4873beb7-5857-4685-be1f-d57550cc96cc"/>
-    <ds:schemaRef ds:uri="http://schemas.microsoft.com/office/2006/documentManagement/types"/>
-    <ds:schemaRef ds:uri="http://schemas.microsoft.com/office/infopath/2007/PartnerControls"/>
-    <ds:schemaRef ds:uri="http://schemas.openxmlformats.org/package/2006/metadata/core-properties"/>
-    <ds:schemaRef ds:uri="http://purl.org/dc/elements/1.1/"/>
-    <ds:schemaRef ds:uri="http://purl.org/dc/terms/"/>
-    <ds:schemaRef ds:uri="http://schemas.microsoft.com/internal/obd"/>
+    <ds:schemaRef ds:uri="http://schemas.microsoft.com/sharepoint/v3/contenttype/forms"/>
   </ds:schemaRefs>
 </ds:datastoreItem>
 </file>
@@ -12526,9 +12702,19 @@
 </file>
 
 <file path=customXml/itemProps3.xml><?xml version="1.0" encoding="utf-8"?>
-<ds:datastoreItem xmlns:ds="http://schemas.openxmlformats.org/officeDocument/2006/customXml" ds:itemID="{561E720F-F05D-4536-9C34-0CFCED65D3B7}">
+<ds:datastoreItem xmlns:ds="http://schemas.openxmlformats.org/officeDocument/2006/customXml" ds:itemID="{28C8B9CA-0273-4370-889A-FC05DA5C2FA5}">
   <ds:schemaRefs>
-    <ds:schemaRef ds:uri="http://schemas.microsoft.com/sharepoint/v3/contenttype/forms"/>
+    <ds:schemaRef ds:uri="http://schemas.microsoft.com/office/2006/metadata/contentType"/>
+    <ds:schemaRef ds:uri="http://schemas.microsoft.com/office/2006/metadata/properties/metaAttributes"/>
+    <ds:schemaRef ds:uri="http://www.w3.org/2001/XMLSchema"/>
+    <ds:schemaRef ds:uri="http://schemas.microsoft.com/office/2006/metadata/properties"/>
+    <ds:schemaRef ds:uri="4873beb7-5857-4685-be1f-d57550cc96cc"/>
+    <ds:schemaRef ds:uri="http://schemas.microsoft.com/office/2006/documentManagement/types"/>
+    <ds:schemaRef ds:uri="http://schemas.microsoft.com/office/infopath/2007/PartnerControls"/>
+    <ds:schemaRef ds:uri="http://schemas.openxmlformats.org/package/2006/metadata/core-properties"/>
+    <ds:schemaRef ds:uri="http://purl.org/dc/elements/1.1/"/>
+    <ds:schemaRef ds:uri="http://purl.org/dc/terms/"/>
+    <ds:schemaRef ds:uri="http://schemas.microsoft.com/internal/obd"/>
   </ds:schemaRefs>
 </ds:datastoreItem>
 </file>
</xml_diff>